<commit_message>
Remove Wifi page from PPT and add Azure Pass best practices
</commit_message>
<xml_diff>
--- a/ppt/GlobalAzure2019-SampleStarterSlides.pptx
+++ b/ppt/GlobalAzure2019-SampleStarterSlides.pptx
@@ -247,7 +247,7 @@
           <a:p>
             <a:fld id="{021C408F-DF0D-4580-9F48-C473147CA8AF}" type="datetimeFigureOut">
               <a:rPr lang="en-US" smtClean="0"/>
-              <a:t>4/21/2019</a:t>
+              <a:t>4/24/2019</a:t>
             </a:fld>
             <a:endParaRPr lang="en-US"/>
           </a:p>
@@ -415,7 +415,7 @@
           <a:p>
             <a:fld id="{021C408F-DF0D-4580-9F48-C473147CA8AF}" type="datetimeFigureOut">
               <a:rPr lang="en-US" smtClean="0"/>
-              <a:t>4/21/2019</a:t>
+              <a:t>4/24/2019</a:t>
             </a:fld>
             <a:endParaRPr lang="en-US"/>
           </a:p>
@@ -593,7 +593,7 @@
           <a:p>
             <a:fld id="{021C408F-DF0D-4580-9F48-C473147CA8AF}" type="datetimeFigureOut">
               <a:rPr lang="en-US" smtClean="0"/>
-              <a:t>4/21/2019</a:t>
+              <a:t>4/24/2019</a:t>
             </a:fld>
             <a:endParaRPr lang="en-US"/>
           </a:p>
@@ -884,7 +884,7 @@
           <a:p>
             <a:fld id="{021C408F-DF0D-4580-9F48-C473147CA8AF}" type="datetimeFigureOut">
               <a:rPr lang="en-US" smtClean="0"/>
-              <a:t>4/21/2019</a:t>
+              <a:t>4/24/2019</a:t>
             </a:fld>
             <a:endParaRPr lang="en-US"/>
           </a:p>
@@ -1129,7 +1129,7 @@
           <a:p>
             <a:fld id="{021C408F-DF0D-4580-9F48-C473147CA8AF}" type="datetimeFigureOut">
               <a:rPr lang="en-US" smtClean="0"/>
-              <a:t>4/21/2019</a:t>
+              <a:t>4/24/2019</a:t>
             </a:fld>
             <a:endParaRPr lang="en-US"/>
           </a:p>
@@ -1358,7 +1358,7 @@
           <a:p>
             <a:fld id="{021C408F-DF0D-4580-9F48-C473147CA8AF}" type="datetimeFigureOut">
               <a:rPr lang="en-US" smtClean="0"/>
-              <a:t>4/21/2019</a:t>
+              <a:t>4/24/2019</a:t>
             </a:fld>
             <a:endParaRPr lang="en-US"/>
           </a:p>
@@ -1722,7 +1722,7 @@
           <a:p>
             <a:fld id="{021C408F-DF0D-4580-9F48-C473147CA8AF}" type="datetimeFigureOut">
               <a:rPr lang="en-US" smtClean="0"/>
-              <a:t>4/21/2019</a:t>
+              <a:t>4/24/2019</a:t>
             </a:fld>
             <a:endParaRPr lang="en-US"/>
           </a:p>
@@ -1839,7 +1839,7 @@
           <a:p>
             <a:fld id="{021C408F-DF0D-4580-9F48-C473147CA8AF}" type="datetimeFigureOut">
               <a:rPr lang="en-US" smtClean="0"/>
-              <a:t>4/21/2019</a:t>
+              <a:t>4/24/2019</a:t>
             </a:fld>
             <a:endParaRPr lang="en-US"/>
           </a:p>
@@ -1934,7 +1934,7 @@
           <a:p>
             <a:fld id="{021C408F-DF0D-4580-9F48-C473147CA8AF}" type="datetimeFigureOut">
               <a:rPr lang="en-US" smtClean="0"/>
-              <a:t>4/21/2019</a:t>
+              <a:t>4/24/2019</a:t>
             </a:fld>
             <a:endParaRPr lang="en-US"/>
           </a:p>
@@ -2209,7 +2209,7 @@
           <a:p>
             <a:fld id="{021C408F-DF0D-4580-9F48-C473147CA8AF}" type="datetimeFigureOut">
               <a:rPr lang="en-US" smtClean="0"/>
-              <a:t>4/21/2019</a:t>
+              <a:t>4/24/2019</a:t>
             </a:fld>
             <a:endParaRPr lang="en-US"/>
           </a:p>
@@ -2461,7 +2461,7 @@
           <a:p>
             <a:fld id="{021C408F-DF0D-4580-9F48-C473147CA8AF}" type="datetimeFigureOut">
               <a:rPr lang="en-US" smtClean="0"/>
-              <a:t>4/21/2019</a:t>
+              <a:t>4/24/2019</a:t>
             </a:fld>
             <a:endParaRPr lang="en-US"/>
           </a:p>
@@ -2672,7 +2672,7 @@
           <a:p>
             <a:fld id="{021C408F-DF0D-4580-9F48-C473147CA8AF}" type="datetimeFigureOut">
               <a:rPr lang="en-US" smtClean="0"/>
-              <a:t>4/21/2019</a:t>
+              <a:t>4/24/2019</a:t>
             </a:fld>
             <a:endParaRPr lang="en-US"/>
           </a:p>
@@ -4552,7 +4552,7 @@
 </file>
 
 <file path=ppt/slides/slide5.xml><?xml version="1.0" encoding="utf-8"?>
-<p:sld xmlns:a="http://schemas.openxmlformats.org/drawingml/2006/main" xmlns:r="http://schemas.openxmlformats.org/officeDocument/2006/relationships" xmlns:p="http://schemas.openxmlformats.org/presentationml/2006/main">
+<p:sld xmlns:a="http://schemas.openxmlformats.org/drawingml/2006/main" xmlns:r="http://schemas.openxmlformats.org/officeDocument/2006/relationships" xmlns:p="http://schemas.openxmlformats.org/presentationml/2006/main" show="0">
   <p:cSld>
     <p:spTree>
       <p:nvGrpSpPr>
@@ -4873,13 +4873,13 @@
   <p:clrMapOvr>
     <a:masterClrMapping/>
   </p:clrMapOvr>
-  <mc:AlternateContent xmlns:mc="http://schemas.openxmlformats.org/markup-compatibility/2006" xmlns:p14="http://schemas.microsoft.com/office/powerpoint/2010/main">
-    <mc:Choice Requires="p14">
+  <mc:AlternateContent xmlns:mc="http://schemas.openxmlformats.org/markup-compatibility/2006">
+    <mc:Choice xmlns:p14="http://schemas.microsoft.com/office/powerpoint/2010/main" Requires="p14">
       <p:transition spd="med" p14:dur="700" advTm="8000">
         <p:fade/>
       </p:transition>
     </mc:Choice>
-    <mc:Fallback xmlns="">
+    <mc:Fallback>
       <p:transition spd="med" advTm="8000">
         <p:fade/>
       </p:transition>
@@ -5115,6 +5115,7 @@
             </a:lvl9pPr>
           </a:lstStyle>
           <a:p>
+            <a:pPr algn="ctr"/>
             <a:r>
               <a:rPr lang="en-US" sz="4800" dirty="0">
                 <a:solidFill>
@@ -5125,6 +5126,7 @@
             </a:r>
           </a:p>
           <a:p>
+            <a:pPr algn="ctr"/>
             <a:r>
               <a:rPr lang="en-US" sz="8800" dirty="0">
                 <a:solidFill>
@@ -5141,8 +5143,9 @@
             </a:endParaRPr>
           </a:p>
           <a:p>
-            <a:r>
-              <a:rPr lang="en-US" sz="8000" dirty="0">
+            <a:pPr algn="ctr"/>
+            <a:r>
+              <a:rPr lang="en-US" sz="8000" b="1" dirty="0">
                 <a:solidFill>
                   <a:schemeClr val="tx1"/>
                 </a:solidFill>

</xml_diff>